<commit_message>
another version of ppt added
</commit_message>
<xml_diff>
--- a/shiny_presentation_version.pptx
+++ b/shiny_presentation_version.pptx
@@ -12,13 +12,17 @@
     <p:sldId id="260" r:id="rId6"/>
     <p:sldId id="261" r:id="rId7"/>
     <p:sldId id="262" r:id="rId8"/>
-    <p:sldId id="263" r:id="rId9"/>
-    <p:sldId id="264" r:id="rId10"/>
-    <p:sldId id="265" r:id="rId11"/>
-    <p:sldId id="266" r:id="rId12"/>
-    <p:sldId id="267" r:id="rId13"/>
-    <p:sldId id="268" r:id="rId14"/>
-    <p:sldId id="269" r:id="rId15"/>
+    <p:sldId id="270" r:id="rId9"/>
+    <p:sldId id="271" r:id="rId10"/>
+    <p:sldId id="263" r:id="rId11"/>
+    <p:sldId id="264" r:id="rId12"/>
+    <p:sldId id="265" r:id="rId13"/>
+    <p:sldId id="266" r:id="rId14"/>
+    <p:sldId id="267" r:id="rId15"/>
+    <p:sldId id="268" r:id="rId16"/>
+    <p:sldId id="272" r:id="rId17"/>
+    <p:sldId id="273" r:id="rId18"/>
+    <p:sldId id="269" r:id="rId19"/>
   </p:sldIdLst>
   <p:sldSz cx="12192000" cy="6858000"/>
   <p:notesSz cx="6858000" cy="9144000"/>
@@ -3709,7 +3713,7 @@
           <p:cNvPr id="2" name="Title 1">
             <a:extLst>
               <a:ext uri="{FF2B5EF4-FFF2-40B4-BE49-F238E27FC236}">
-                <a16:creationId xmlns:a16="http://schemas.microsoft.com/office/drawing/2014/main" id="{E3C95A09-B4A1-8C43-BFEA-BF480A2AE394}"/>
+                <a16:creationId xmlns:a16="http://schemas.microsoft.com/office/drawing/2014/main" id="{363C16CC-EB74-E946-A5F1-0857F22B42E0}"/>
               </a:ext>
             </a:extLst>
           </p:cNvPr>
@@ -3727,7 +3731,7 @@
           <a:p>
             <a:r>
               <a:rPr lang="en-US" cap="none" dirty="0"/>
-              <a:t>AWAY RED CARD FOR DIFFERENT</a:t>
+              <a:t>TOTAL AWAY GOAL FOR DIFFERENT</a:t>
             </a:r>
             <a:endParaRPr lang="en-US" dirty="0"/>
           </a:p>
@@ -3738,7 +3742,7 @@
           <p:cNvPr id="5" name="Content Placeholder 4">
             <a:extLst>
               <a:ext uri="{FF2B5EF4-FFF2-40B4-BE49-F238E27FC236}">
-                <a16:creationId xmlns:a16="http://schemas.microsoft.com/office/drawing/2014/main" id="{BB2C24BD-8D94-8248-BC93-6D8500744E6F}"/>
+                <a16:creationId xmlns:a16="http://schemas.microsoft.com/office/drawing/2014/main" id="{A25C0CF7-3AA0-CA47-841C-4519C03DE070}"/>
               </a:ext>
             </a:extLst>
           </p:cNvPr>
@@ -3757,15 +3761,15 @@
         </p:blipFill>
         <p:spPr>
           <a:xfrm>
-            <a:off x="1956036" y="2016125"/>
-            <a:ext cx="8594253" cy="3449638"/>
+            <a:off x="1918539" y="2016125"/>
+            <a:ext cx="8669247" cy="3449638"/>
           </a:xfrm>
         </p:spPr>
       </p:pic>
     </p:spTree>
     <p:extLst>
       <p:ext uri="{BB962C8B-B14F-4D97-AF65-F5344CB8AC3E}">
-        <p14:creationId xmlns:p14="http://schemas.microsoft.com/office/powerpoint/2010/main" val="2264983297"/>
+        <p14:creationId xmlns:p14="http://schemas.microsoft.com/office/powerpoint/2010/main" val="3169691642"/>
       </p:ext>
     </p:extLst>
   </p:cSld>
@@ -3797,7 +3801,7 @@
           <p:cNvPr id="2" name="Title 1">
             <a:extLst>
               <a:ext uri="{FF2B5EF4-FFF2-40B4-BE49-F238E27FC236}">
-                <a16:creationId xmlns:a16="http://schemas.microsoft.com/office/drawing/2014/main" id="{A08F62A4-AC14-974C-B86F-EBB1586FE251}"/>
+                <a16:creationId xmlns:a16="http://schemas.microsoft.com/office/drawing/2014/main" id="{9B8897B7-6305-3945-8DEF-E4F2B7374ADC}"/>
               </a:ext>
             </a:extLst>
           </p:cNvPr>
@@ -3815,7 +3819,7 @@
           <a:p>
             <a:r>
               <a:rPr lang="en-US" cap="none" dirty="0"/>
-              <a:t>AWAY AVARAGE RED CARD FOR DIFFERENT</a:t>
+              <a:t>AVARAGE GOAL FOR AWAY TEAM</a:t>
             </a:r>
             <a:endParaRPr lang="en-US" dirty="0"/>
           </a:p>
@@ -3826,7 +3830,7 @@
           <p:cNvPr id="5" name="Content Placeholder 4">
             <a:extLst>
               <a:ext uri="{FF2B5EF4-FFF2-40B4-BE49-F238E27FC236}">
-                <a16:creationId xmlns:a16="http://schemas.microsoft.com/office/drawing/2014/main" id="{50F05102-E8CD-3D48-9B2D-E576BD9C22CC}"/>
+                <a16:creationId xmlns:a16="http://schemas.microsoft.com/office/drawing/2014/main" id="{C51F6C04-FF44-FE4D-AA15-8C296A9F8258}"/>
               </a:ext>
             </a:extLst>
           </p:cNvPr>
@@ -3845,75 +3849,15 @@
         </p:blipFill>
         <p:spPr>
           <a:xfrm>
-            <a:off x="1359535" y="2195494"/>
-            <a:ext cx="9604375" cy="3127475"/>
-          </a:xfrm>
-        </p:spPr>
-      </p:pic>
-      <p:pic>
-        <p:nvPicPr>
-          <p:cNvPr id="6" name="Content Placeholder 4">
-            <a:extLst>
-              <a:ext uri="{FF2B5EF4-FFF2-40B4-BE49-F238E27FC236}">
-                <a16:creationId xmlns:a16="http://schemas.microsoft.com/office/drawing/2014/main" id="{A7C98CCC-8EA2-F049-BF59-BD3EB8ECEDE3}"/>
-              </a:ext>
-            </a:extLst>
-          </p:cNvPr>
-          <p:cNvPicPr>
-            <a:picLocks noChangeAspect="1"/>
-          </p:cNvPicPr>
-          <p:nvPr/>
-        </p:nvPicPr>
-        <p:blipFill>
-          <a:blip r:embed="rId2"/>
-          <a:stretch>
-            <a:fillRect/>
-          </a:stretch>
-        </p:blipFill>
-        <p:spPr>
-          <a:xfrm>
-            <a:off x="1149223" y="2204638"/>
-            <a:ext cx="9604375" cy="3127475"/>
-          </a:xfrm>
-          <a:prstGeom prst="rect">
-            <a:avLst/>
-          </a:prstGeom>
-        </p:spPr>
-      </p:pic>
-      <p:pic>
-        <p:nvPicPr>
-          <p:cNvPr id="7" name="Content Placeholder 4">
-            <a:extLst>
-              <a:ext uri="{FF2B5EF4-FFF2-40B4-BE49-F238E27FC236}">
-                <a16:creationId xmlns:a16="http://schemas.microsoft.com/office/drawing/2014/main" id="{375DD26D-E32D-614B-98AC-7C06DD1C7275}"/>
-              </a:ext>
-            </a:extLst>
-          </p:cNvPr>
-          <p:cNvPicPr>
-            <a:picLocks noChangeAspect="1"/>
-          </p:cNvPicPr>
-          <p:nvPr/>
-        </p:nvPicPr>
-        <p:blipFill>
-          <a:blip r:embed="rId2"/>
-          <a:stretch>
-            <a:fillRect/>
-          </a:stretch>
-        </p:blipFill>
-        <p:spPr>
-          <a:xfrm>
-            <a:off x="1293812" y="2213782"/>
-            <a:ext cx="9604375" cy="3127475"/>
-          </a:xfrm>
-          <a:prstGeom prst="rect">
-            <a:avLst/>
-          </a:prstGeom>
+            <a:off x="1450975" y="2230633"/>
+            <a:ext cx="9604375" cy="3020622"/>
+          </a:xfrm>
         </p:spPr>
       </p:pic>
     </p:spTree>
     <p:extLst>
       <p:ext uri="{BB962C8B-B14F-4D97-AF65-F5344CB8AC3E}">
-        <p14:creationId xmlns:p14="http://schemas.microsoft.com/office/powerpoint/2010/main" val="227983468"/>
+        <p14:creationId xmlns:p14="http://schemas.microsoft.com/office/powerpoint/2010/main" val="3037211085"/>
       </p:ext>
     </p:extLst>
   </p:cSld>
@@ -3945,7 +3889,7 @@
           <p:cNvPr id="2" name="Title 1">
             <a:extLst>
               <a:ext uri="{FF2B5EF4-FFF2-40B4-BE49-F238E27FC236}">
-                <a16:creationId xmlns:a16="http://schemas.microsoft.com/office/drawing/2014/main" id="{B3D76CEE-0A1C-D945-996A-C6839817B618}"/>
+                <a16:creationId xmlns:a16="http://schemas.microsoft.com/office/drawing/2014/main" id="{E3C95A09-B4A1-8C43-BFEA-BF480A2AE394}"/>
               </a:ext>
             </a:extLst>
           </p:cNvPr>
@@ -3963,7 +3907,7 @@
           <a:p>
             <a:r>
               <a:rPr lang="en-US" cap="none" dirty="0"/>
-              <a:t>AWAY TEAM POSSESSION FOR DIFFERENT</a:t>
+              <a:t>AWAY RED CARD FOR DIFFERENT</a:t>
             </a:r>
             <a:endParaRPr lang="en-US" dirty="0"/>
           </a:p>
@@ -3974,7 +3918,7 @@
           <p:cNvPr id="5" name="Content Placeholder 4">
             <a:extLst>
               <a:ext uri="{FF2B5EF4-FFF2-40B4-BE49-F238E27FC236}">
-                <a16:creationId xmlns:a16="http://schemas.microsoft.com/office/drawing/2014/main" id="{6366138A-DF65-804C-BA29-F52BFEDBA6C2}"/>
+                <a16:creationId xmlns:a16="http://schemas.microsoft.com/office/drawing/2014/main" id="{BB2C24BD-8D94-8248-BC93-6D8500744E6F}"/>
               </a:ext>
             </a:extLst>
           </p:cNvPr>
@@ -3993,15 +3937,15 @@
         </p:blipFill>
         <p:spPr>
           <a:xfrm>
-            <a:off x="1777956" y="2016125"/>
-            <a:ext cx="8950412" cy="3449638"/>
+            <a:off x="1956036" y="2016125"/>
+            <a:ext cx="8594253" cy="3449638"/>
           </a:xfrm>
         </p:spPr>
       </p:pic>
     </p:spTree>
     <p:extLst>
       <p:ext uri="{BB962C8B-B14F-4D97-AF65-F5344CB8AC3E}">
-        <p14:creationId xmlns:p14="http://schemas.microsoft.com/office/powerpoint/2010/main" val="3861771915"/>
+        <p14:creationId xmlns:p14="http://schemas.microsoft.com/office/powerpoint/2010/main" val="2264983297"/>
       </p:ext>
     </p:extLst>
   </p:cSld>
@@ -4033,7 +3977,7 @@
           <p:cNvPr id="2" name="Title 1">
             <a:extLst>
               <a:ext uri="{FF2B5EF4-FFF2-40B4-BE49-F238E27FC236}">
-                <a16:creationId xmlns:a16="http://schemas.microsoft.com/office/drawing/2014/main" id="{D4CF16DF-7B33-8248-9099-78777D34215E}"/>
+                <a16:creationId xmlns:a16="http://schemas.microsoft.com/office/drawing/2014/main" id="{A08F62A4-AC14-974C-B86F-EBB1586FE251}"/>
               </a:ext>
             </a:extLst>
           </p:cNvPr>
@@ -4051,7 +3995,7 @@
           <a:p>
             <a:r>
               <a:rPr lang="en-US" cap="none" dirty="0"/>
-              <a:t>AVARAGE POSSESSION FOR DIFFERENT</a:t>
+              <a:t>AWAY AVARAGE RED CARD FOR DIFFERENT</a:t>
             </a:r>
             <a:endParaRPr lang="en-US" dirty="0"/>
           </a:p>
@@ -4062,7 +4006,7 @@
           <p:cNvPr id="5" name="Content Placeholder 4">
             <a:extLst>
               <a:ext uri="{FF2B5EF4-FFF2-40B4-BE49-F238E27FC236}">
-                <a16:creationId xmlns:a16="http://schemas.microsoft.com/office/drawing/2014/main" id="{C29F3899-833B-9C4F-B273-5962903E0DDA}"/>
+                <a16:creationId xmlns:a16="http://schemas.microsoft.com/office/drawing/2014/main" id="{50F05102-E8CD-3D48-9B2D-E576BD9C22CC}"/>
               </a:ext>
             </a:extLst>
           </p:cNvPr>
@@ -4081,15 +4025,75 @@
         </p:blipFill>
         <p:spPr>
           <a:xfrm>
-            <a:off x="1450975" y="2268004"/>
-            <a:ext cx="9604375" cy="2945879"/>
-          </a:xfrm>
+            <a:off x="1359535" y="2195494"/>
+            <a:ext cx="9604375" cy="3127475"/>
+          </a:xfrm>
+        </p:spPr>
+      </p:pic>
+      <p:pic>
+        <p:nvPicPr>
+          <p:cNvPr id="6" name="Content Placeholder 4">
+            <a:extLst>
+              <a:ext uri="{FF2B5EF4-FFF2-40B4-BE49-F238E27FC236}">
+                <a16:creationId xmlns:a16="http://schemas.microsoft.com/office/drawing/2014/main" id="{A7C98CCC-8EA2-F049-BF59-BD3EB8ECEDE3}"/>
+              </a:ext>
+            </a:extLst>
+          </p:cNvPr>
+          <p:cNvPicPr>
+            <a:picLocks noChangeAspect="1"/>
+          </p:cNvPicPr>
+          <p:nvPr/>
+        </p:nvPicPr>
+        <p:blipFill>
+          <a:blip r:embed="rId2"/>
+          <a:stretch>
+            <a:fillRect/>
+          </a:stretch>
+        </p:blipFill>
+        <p:spPr>
+          <a:xfrm>
+            <a:off x="1149223" y="2204638"/>
+            <a:ext cx="9604375" cy="3127475"/>
+          </a:xfrm>
+          <a:prstGeom prst="rect">
+            <a:avLst/>
+          </a:prstGeom>
+        </p:spPr>
+      </p:pic>
+      <p:pic>
+        <p:nvPicPr>
+          <p:cNvPr id="7" name="Content Placeholder 4">
+            <a:extLst>
+              <a:ext uri="{FF2B5EF4-FFF2-40B4-BE49-F238E27FC236}">
+                <a16:creationId xmlns:a16="http://schemas.microsoft.com/office/drawing/2014/main" id="{375DD26D-E32D-614B-98AC-7C06DD1C7275}"/>
+              </a:ext>
+            </a:extLst>
+          </p:cNvPr>
+          <p:cNvPicPr>
+            <a:picLocks noChangeAspect="1"/>
+          </p:cNvPicPr>
+          <p:nvPr/>
+        </p:nvPicPr>
+        <p:blipFill>
+          <a:blip r:embed="rId2"/>
+          <a:stretch>
+            <a:fillRect/>
+          </a:stretch>
+        </p:blipFill>
+        <p:spPr>
+          <a:xfrm>
+            <a:off x="1293812" y="2213782"/>
+            <a:ext cx="9604375" cy="3127475"/>
+          </a:xfrm>
+          <a:prstGeom prst="rect">
+            <a:avLst/>
+          </a:prstGeom>
         </p:spPr>
       </p:pic>
     </p:spTree>
     <p:extLst>
       <p:ext uri="{BB962C8B-B14F-4D97-AF65-F5344CB8AC3E}">
-        <p14:creationId xmlns:p14="http://schemas.microsoft.com/office/powerpoint/2010/main" val="3325934338"/>
+        <p14:creationId xmlns:p14="http://schemas.microsoft.com/office/powerpoint/2010/main" val="227983468"/>
       </p:ext>
     </p:extLst>
   </p:cSld>
@@ -4121,6 +4125,422 @@
           <p:cNvPr id="2" name="Title 1">
             <a:extLst>
               <a:ext uri="{FF2B5EF4-FFF2-40B4-BE49-F238E27FC236}">
+                <a16:creationId xmlns:a16="http://schemas.microsoft.com/office/drawing/2014/main" id="{B3D76CEE-0A1C-D945-996A-C6839817B618}"/>
+              </a:ext>
+            </a:extLst>
+          </p:cNvPr>
+          <p:cNvSpPr>
+            <a:spLocks noGrp="1"/>
+          </p:cNvSpPr>
+          <p:nvPr>
+            <p:ph type="title"/>
+          </p:nvPr>
+        </p:nvSpPr>
+        <p:spPr/>
+        <p:txBody>
+          <a:bodyPr/>
+          <a:lstStyle/>
+          <a:p>
+            <a:r>
+              <a:rPr lang="en-US" cap="none" dirty="0"/>
+              <a:t>AWAY TEAM POSSESSION FOR DIFFERENT</a:t>
+            </a:r>
+            <a:endParaRPr lang="en-US" dirty="0"/>
+          </a:p>
+        </p:txBody>
+      </p:sp>
+      <p:pic>
+        <p:nvPicPr>
+          <p:cNvPr id="5" name="Content Placeholder 4">
+            <a:extLst>
+              <a:ext uri="{FF2B5EF4-FFF2-40B4-BE49-F238E27FC236}">
+                <a16:creationId xmlns:a16="http://schemas.microsoft.com/office/drawing/2014/main" id="{6366138A-DF65-804C-BA29-F52BFEDBA6C2}"/>
+              </a:ext>
+            </a:extLst>
+          </p:cNvPr>
+          <p:cNvPicPr>
+            <a:picLocks noGrp="1" noChangeAspect="1"/>
+          </p:cNvPicPr>
+          <p:nvPr>
+            <p:ph idx="1"/>
+          </p:nvPr>
+        </p:nvPicPr>
+        <p:blipFill>
+          <a:blip r:embed="rId2"/>
+          <a:stretch>
+            <a:fillRect/>
+          </a:stretch>
+        </p:blipFill>
+        <p:spPr>
+          <a:xfrm>
+            <a:off x="1777956" y="2016125"/>
+            <a:ext cx="8950412" cy="3449638"/>
+          </a:xfrm>
+        </p:spPr>
+      </p:pic>
+    </p:spTree>
+    <p:extLst>
+      <p:ext uri="{BB962C8B-B14F-4D97-AF65-F5344CB8AC3E}">
+        <p14:creationId xmlns:p14="http://schemas.microsoft.com/office/powerpoint/2010/main" val="3861771915"/>
+      </p:ext>
+    </p:extLst>
+  </p:cSld>
+  <p:clrMapOvr>
+    <a:masterClrMapping/>
+  </p:clrMapOvr>
+</p:sld>
+</file>
+
+<file path=ppt/slides/slide15.xml><?xml version="1.0" encoding="utf-8"?>
+<p:sld xmlns:a="http://schemas.openxmlformats.org/drawingml/2006/main" xmlns:r="http://schemas.openxmlformats.org/officeDocument/2006/relationships" xmlns:p="http://schemas.openxmlformats.org/presentationml/2006/main">
+  <p:cSld>
+    <p:spTree>
+      <p:nvGrpSpPr>
+        <p:cNvPr id="1" name=""/>
+        <p:cNvGrpSpPr/>
+        <p:nvPr/>
+      </p:nvGrpSpPr>
+      <p:grpSpPr>
+        <a:xfrm>
+          <a:off x="0" y="0"/>
+          <a:ext cx="0" cy="0"/>
+          <a:chOff x="0" y="0"/>
+          <a:chExt cx="0" cy="0"/>
+        </a:xfrm>
+      </p:grpSpPr>
+      <p:sp>
+        <p:nvSpPr>
+          <p:cNvPr id="2" name="Title 1">
+            <a:extLst>
+              <a:ext uri="{FF2B5EF4-FFF2-40B4-BE49-F238E27FC236}">
+                <a16:creationId xmlns:a16="http://schemas.microsoft.com/office/drawing/2014/main" id="{D4CF16DF-7B33-8248-9099-78777D34215E}"/>
+              </a:ext>
+            </a:extLst>
+          </p:cNvPr>
+          <p:cNvSpPr>
+            <a:spLocks noGrp="1"/>
+          </p:cNvSpPr>
+          <p:nvPr>
+            <p:ph type="title"/>
+          </p:nvPr>
+        </p:nvSpPr>
+        <p:spPr/>
+        <p:txBody>
+          <a:bodyPr/>
+          <a:lstStyle/>
+          <a:p>
+            <a:r>
+              <a:rPr lang="en-US" cap="none" dirty="0"/>
+              <a:t>AVARAGE POSSESSION FOR DIFFERENT</a:t>
+            </a:r>
+            <a:endParaRPr lang="en-US" dirty="0"/>
+          </a:p>
+        </p:txBody>
+      </p:sp>
+      <p:pic>
+        <p:nvPicPr>
+          <p:cNvPr id="5" name="Content Placeholder 4">
+            <a:extLst>
+              <a:ext uri="{FF2B5EF4-FFF2-40B4-BE49-F238E27FC236}">
+                <a16:creationId xmlns:a16="http://schemas.microsoft.com/office/drawing/2014/main" id="{C29F3899-833B-9C4F-B273-5962903E0DDA}"/>
+              </a:ext>
+            </a:extLst>
+          </p:cNvPr>
+          <p:cNvPicPr>
+            <a:picLocks noGrp="1" noChangeAspect="1"/>
+          </p:cNvPicPr>
+          <p:nvPr>
+            <p:ph idx="1"/>
+          </p:nvPr>
+        </p:nvPicPr>
+        <p:blipFill>
+          <a:blip r:embed="rId2"/>
+          <a:stretch>
+            <a:fillRect/>
+          </a:stretch>
+        </p:blipFill>
+        <p:spPr>
+          <a:xfrm>
+            <a:off x="1450975" y="2268004"/>
+            <a:ext cx="9604375" cy="2945879"/>
+          </a:xfrm>
+        </p:spPr>
+      </p:pic>
+    </p:spTree>
+    <p:extLst>
+      <p:ext uri="{BB962C8B-B14F-4D97-AF65-F5344CB8AC3E}">
+        <p14:creationId xmlns:p14="http://schemas.microsoft.com/office/powerpoint/2010/main" val="3325934338"/>
+      </p:ext>
+    </p:extLst>
+  </p:cSld>
+  <p:clrMapOvr>
+    <a:masterClrMapping/>
+  </p:clrMapOvr>
+</p:sld>
+</file>
+
+<file path=ppt/slides/slide16.xml><?xml version="1.0" encoding="utf-8"?>
+<p:sld xmlns:a="http://schemas.openxmlformats.org/drawingml/2006/main" xmlns:r="http://schemas.openxmlformats.org/officeDocument/2006/relationships" xmlns:p="http://schemas.openxmlformats.org/presentationml/2006/main">
+  <p:cSld>
+    <p:spTree>
+      <p:nvGrpSpPr>
+        <p:cNvPr id="1" name=""/>
+        <p:cNvGrpSpPr/>
+        <p:nvPr/>
+      </p:nvGrpSpPr>
+      <p:grpSpPr>
+        <a:xfrm>
+          <a:off x="0" y="0"/>
+          <a:ext cx="0" cy="0"/>
+          <a:chOff x="0" y="0"/>
+          <a:chExt cx="0" cy="0"/>
+        </a:xfrm>
+      </p:grpSpPr>
+      <p:sp>
+        <p:nvSpPr>
+          <p:cNvPr id="2" name="Title 1">
+            <a:extLst>
+              <a:ext uri="{FF2B5EF4-FFF2-40B4-BE49-F238E27FC236}">
+                <a16:creationId xmlns:a16="http://schemas.microsoft.com/office/drawing/2014/main" id="{5D6D2B4C-04D6-EE4F-B72E-2218C6D51726}"/>
+              </a:ext>
+            </a:extLst>
+          </p:cNvPr>
+          <p:cNvSpPr>
+            <a:spLocks noGrp="1"/>
+          </p:cNvSpPr>
+          <p:nvPr>
+            <p:ph type="title"/>
+          </p:nvPr>
+        </p:nvSpPr>
+        <p:spPr>
+          <a:xfrm>
+            <a:off x="1451579" y="804519"/>
+            <a:ext cx="9603275" cy="521361"/>
+          </a:xfrm>
+        </p:spPr>
+        <p:txBody>
+          <a:bodyPr/>
+          <a:lstStyle/>
+          <a:p>
+            <a:r>
+              <a:rPr lang="en-US" dirty="0"/>
+              <a:t>Total corner away</a:t>
+            </a:r>
+          </a:p>
+        </p:txBody>
+      </p:sp>
+      <p:sp>
+        <p:nvSpPr>
+          <p:cNvPr id="3" name="Content Placeholder 2">
+            <a:extLst>
+              <a:ext uri="{FF2B5EF4-FFF2-40B4-BE49-F238E27FC236}">
+                <a16:creationId xmlns:a16="http://schemas.microsoft.com/office/drawing/2014/main" id="{EBC91ABD-850B-8447-BB2D-0FA2A36559DA}"/>
+              </a:ext>
+            </a:extLst>
+          </p:cNvPr>
+          <p:cNvSpPr>
+            <a:spLocks noGrp="1"/>
+          </p:cNvSpPr>
+          <p:nvPr>
+            <p:ph idx="1"/>
+          </p:nvPr>
+        </p:nvSpPr>
+        <p:spPr/>
+        <p:txBody>
+          <a:bodyPr/>
+          <a:lstStyle/>
+          <a:p>
+            <a:endParaRPr lang="en-US" dirty="0"/>
+          </a:p>
+        </p:txBody>
+      </p:sp>
+      <p:pic>
+        <p:nvPicPr>
+          <p:cNvPr id="5" name="Picture 4">
+            <a:extLst>
+              <a:ext uri="{FF2B5EF4-FFF2-40B4-BE49-F238E27FC236}">
+                <a16:creationId xmlns:a16="http://schemas.microsoft.com/office/drawing/2014/main" id="{EAD86C49-5983-514A-9729-533A37E6F820}"/>
+              </a:ext>
+            </a:extLst>
+          </p:cNvPr>
+          <p:cNvPicPr>
+            <a:picLocks noChangeAspect="1"/>
+          </p:cNvPicPr>
+          <p:nvPr/>
+        </p:nvPicPr>
+        <p:blipFill>
+          <a:blip r:embed="rId2"/>
+          <a:stretch>
+            <a:fillRect/>
+          </a:stretch>
+        </p:blipFill>
+        <p:spPr>
+          <a:xfrm>
+            <a:off x="1371600" y="1436212"/>
+            <a:ext cx="10287000" cy="4030133"/>
+          </a:xfrm>
+          <a:prstGeom prst="rect">
+            <a:avLst/>
+          </a:prstGeom>
+        </p:spPr>
+      </p:pic>
+    </p:spTree>
+    <p:extLst>
+      <p:ext uri="{BB962C8B-B14F-4D97-AF65-F5344CB8AC3E}">
+        <p14:creationId xmlns:p14="http://schemas.microsoft.com/office/powerpoint/2010/main" val="2687781787"/>
+      </p:ext>
+    </p:extLst>
+  </p:cSld>
+  <p:clrMapOvr>
+    <a:masterClrMapping/>
+  </p:clrMapOvr>
+</p:sld>
+</file>
+
+<file path=ppt/slides/slide17.xml><?xml version="1.0" encoding="utf-8"?>
+<p:sld xmlns:a="http://schemas.openxmlformats.org/drawingml/2006/main" xmlns:r="http://schemas.openxmlformats.org/officeDocument/2006/relationships" xmlns:p="http://schemas.openxmlformats.org/presentationml/2006/main">
+  <p:cSld>
+    <p:spTree>
+      <p:nvGrpSpPr>
+        <p:cNvPr id="1" name=""/>
+        <p:cNvGrpSpPr/>
+        <p:nvPr/>
+      </p:nvGrpSpPr>
+      <p:grpSpPr>
+        <a:xfrm>
+          <a:off x="0" y="0"/>
+          <a:ext cx="0" cy="0"/>
+          <a:chOff x="0" y="0"/>
+          <a:chExt cx="0" cy="0"/>
+        </a:xfrm>
+      </p:grpSpPr>
+      <p:sp>
+        <p:nvSpPr>
+          <p:cNvPr id="2" name="Title 1">
+            <a:extLst>
+              <a:ext uri="{FF2B5EF4-FFF2-40B4-BE49-F238E27FC236}">
+                <a16:creationId xmlns:a16="http://schemas.microsoft.com/office/drawing/2014/main" id="{B49BD940-912C-FD45-9503-CE65C89ACE97}"/>
+              </a:ext>
+            </a:extLst>
+          </p:cNvPr>
+          <p:cNvSpPr>
+            <a:spLocks noGrp="1"/>
+          </p:cNvSpPr>
+          <p:nvPr>
+            <p:ph type="title"/>
+          </p:nvPr>
+        </p:nvSpPr>
+        <p:spPr/>
+        <p:txBody>
+          <a:bodyPr>
+            <a:normAutofit/>
+          </a:bodyPr>
+          <a:lstStyle/>
+          <a:p>
+            <a:r>
+              <a:rPr lang="en-US" sz="2800" cap="none" dirty="0"/>
+              <a:t>Continues</a:t>
+            </a:r>
+            <a:br>
+              <a:rPr lang="en-US" sz="2800" cap="none" dirty="0"/>
+            </a:br>
+            <a:r>
+              <a:rPr lang="en-US" sz="2800" cap="none" dirty="0"/>
+              <a:t>AVARAGE OF CORNER AT AWAY</a:t>
+            </a:r>
+          </a:p>
+        </p:txBody>
+      </p:sp>
+      <p:sp>
+        <p:nvSpPr>
+          <p:cNvPr id="3" name="Content Placeholder 2">
+            <a:extLst>
+              <a:ext uri="{FF2B5EF4-FFF2-40B4-BE49-F238E27FC236}">
+                <a16:creationId xmlns:a16="http://schemas.microsoft.com/office/drawing/2014/main" id="{166B8108-6CCF-6749-98C4-476E71284CB4}"/>
+              </a:ext>
+            </a:extLst>
+          </p:cNvPr>
+          <p:cNvSpPr>
+            <a:spLocks noGrp="1"/>
+          </p:cNvSpPr>
+          <p:nvPr>
+            <p:ph idx="1"/>
+          </p:nvPr>
+        </p:nvSpPr>
+        <p:spPr/>
+        <p:txBody>
+          <a:bodyPr/>
+          <a:lstStyle/>
+          <a:p>
+            <a:endParaRPr lang="en-US" dirty="0"/>
+          </a:p>
+        </p:txBody>
+      </p:sp>
+      <p:pic>
+        <p:nvPicPr>
+          <p:cNvPr id="5" name="Picture 4">
+            <a:extLst>
+              <a:ext uri="{FF2B5EF4-FFF2-40B4-BE49-F238E27FC236}">
+                <a16:creationId xmlns:a16="http://schemas.microsoft.com/office/drawing/2014/main" id="{8AE79099-BF0B-B543-9B81-BD78F1FCEACE}"/>
+              </a:ext>
+            </a:extLst>
+          </p:cNvPr>
+          <p:cNvPicPr>
+            <a:picLocks noChangeAspect="1"/>
+          </p:cNvPicPr>
+          <p:nvPr/>
+        </p:nvPicPr>
+        <p:blipFill>
+          <a:blip r:embed="rId2"/>
+          <a:stretch>
+            <a:fillRect/>
+          </a:stretch>
+        </p:blipFill>
+        <p:spPr>
+          <a:xfrm>
+            <a:off x="0" y="2039472"/>
+            <a:ext cx="12070080" cy="4014009"/>
+          </a:xfrm>
+          <a:prstGeom prst="rect">
+            <a:avLst/>
+          </a:prstGeom>
+        </p:spPr>
+      </p:pic>
+    </p:spTree>
+    <p:extLst>
+      <p:ext uri="{BB962C8B-B14F-4D97-AF65-F5344CB8AC3E}">
+        <p14:creationId xmlns:p14="http://schemas.microsoft.com/office/powerpoint/2010/main" val="3024959553"/>
+      </p:ext>
+    </p:extLst>
+  </p:cSld>
+  <p:clrMapOvr>
+    <a:masterClrMapping/>
+  </p:clrMapOvr>
+</p:sld>
+</file>
+
+<file path=ppt/slides/slide18.xml><?xml version="1.0" encoding="utf-8"?>
+<p:sld xmlns:a="http://schemas.openxmlformats.org/drawingml/2006/main" xmlns:r="http://schemas.openxmlformats.org/officeDocument/2006/relationships" xmlns:p="http://schemas.openxmlformats.org/presentationml/2006/main">
+  <p:cSld>
+    <p:spTree>
+      <p:nvGrpSpPr>
+        <p:cNvPr id="1" name=""/>
+        <p:cNvGrpSpPr/>
+        <p:nvPr/>
+      </p:nvGrpSpPr>
+      <p:grpSpPr>
+        <a:xfrm>
+          <a:off x="0" y="0"/>
+          <a:ext cx="0" cy="0"/>
+          <a:chOff x="0" y="0"/>
+          <a:chExt cx="0" cy="0"/>
+        </a:xfrm>
+      </p:grpSpPr>
+      <p:sp>
+        <p:nvSpPr>
+          <p:cNvPr id="2" name="Title 1">
+            <a:extLst>
+              <a:ext uri="{FF2B5EF4-FFF2-40B4-BE49-F238E27FC236}">
                 <a16:creationId xmlns:a16="http://schemas.microsoft.com/office/drawing/2014/main" id="{5235FC32-7D22-C841-AB7C-6D9238B22EEE}"/>
               </a:ext>
             </a:extLst>
@@ -4167,13 +4587,8 @@
           <a:p>
             <a:r>
               <a:rPr lang="en-US" dirty="0"/>
-              <a:t>Future project: Is to automate the different season </a:t>
-            </a:r>
-            <a:r>
-              <a:rPr lang="en-US"/>
-              <a:t>for different year</a:t>
-            </a:r>
-            <a:endParaRPr lang="en-US" dirty="0"/>
+              <a:t>Future project: Is to automate the different season for different year</a:t>
+            </a:r>
           </a:p>
           <a:p>
             <a:r>
@@ -4775,7 +5190,7 @@
           <p:cNvPr id="2" name="Title 1">
             <a:extLst>
               <a:ext uri="{FF2B5EF4-FFF2-40B4-BE49-F238E27FC236}">
-                <a16:creationId xmlns:a16="http://schemas.microsoft.com/office/drawing/2014/main" id="{363C16CC-EB74-E946-A5F1-0857F22B42E0}"/>
+                <a16:creationId xmlns:a16="http://schemas.microsoft.com/office/drawing/2014/main" id="{079FA95D-30C2-B945-91FE-6A4DA593F7E9}"/>
               </a:ext>
             </a:extLst>
           </p:cNvPr>
@@ -4786,34 +5201,61 @@
             <p:ph type="title"/>
           </p:nvPr>
         </p:nvSpPr>
+        <p:spPr>
+          <a:xfrm>
+            <a:off x="1451579" y="804519"/>
+            <a:ext cx="9603275" cy="630581"/>
+          </a:xfrm>
+        </p:spPr>
+        <p:txBody>
+          <a:bodyPr/>
+          <a:lstStyle/>
+          <a:p>
+            <a:r>
+              <a:rPr lang="en-US" dirty="0"/>
+              <a:t>Total corner at home</a:t>
+            </a:r>
+          </a:p>
+        </p:txBody>
+      </p:sp>
+      <p:sp>
+        <p:nvSpPr>
+          <p:cNvPr id="3" name="Content Placeholder 2">
+            <a:extLst>
+              <a:ext uri="{FF2B5EF4-FFF2-40B4-BE49-F238E27FC236}">
+                <a16:creationId xmlns:a16="http://schemas.microsoft.com/office/drawing/2014/main" id="{3D471285-6DAB-5E46-A3C8-4D8AD4310335}"/>
+              </a:ext>
+            </a:extLst>
+          </p:cNvPr>
+          <p:cNvSpPr>
+            <a:spLocks noGrp="1"/>
+          </p:cNvSpPr>
+          <p:nvPr>
+            <p:ph idx="1"/>
+          </p:nvPr>
+        </p:nvSpPr>
         <p:spPr/>
         <p:txBody>
           <a:bodyPr/>
           <a:lstStyle/>
           <a:p>
-            <a:r>
-              <a:rPr lang="en-US" cap="none" dirty="0"/>
-              <a:t>TOTAL AWAY GOAL FOR DIFFERENT</a:t>
-            </a:r>
             <a:endParaRPr lang="en-US" dirty="0"/>
           </a:p>
         </p:txBody>
       </p:sp>
       <p:pic>
         <p:nvPicPr>
-          <p:cNvPr id="5" name="Content Placeholder 4">
+          <p:cNvPr id="5" name="Picture 4">
             <a:extLst>
               <a:ext uri="{FF2B5EF4-FFF2-40B4-BE49-F238E27FC236}">
-                <a16:creationId xmlns:a16="http://schemas.microsoft.com/office/drawing/2014/main" id="{A25C0CF7-3AA0-CA47-841C-4519C03DE070}"/>
+                <a16:creationId xmlns:a16="http://schemas.microsoft.com/office/drawing/2014/main" id="{53257CDC-BB07-B743-8F6B-88EA63A8D8F9}"/>
               </a:ext>
             </a:extLst>
           </p:cNvPr>
           <p:cNvPicPr>
-            <a:picLocks noGrp="1" noChangeAspect="1"/>
+            <a:picLocks noChangeAspect="1"/>
           </p:cNvPicPr>
-          <p:nvPr>
-            <p:ph idx="1"/>
-          </p:nvPr>
+          <p:nvPr/>
         </p:nvPicPr>
         <p:blipFill>
           <a:blip r:embed="rId2"/>
@@ -4823,15 +5265,18 @@
         </p:blipFill>
         <p:spPr>
           <a:xfrm>
-            <a:off x="1918539" y="2016125"/>
-            <a:ext cx="8669247" cy="3449638"/>
-          </a:xfrm>
+            <a:off x="118872" y="1435100"/>
+            <a:ext cx="11192256" cy="3987800"/>
+          </a:xfrm>
+          <a:prstGeom prst="rect">
+            <a:avLst/>
+          </a:prstGeom>
         </p:spPr>
       </p:pic>
     </p:spTree>
     <p:extLst>
       <p:ext uri="{BB962C8B-B14F-4D97-AF65-F5344CB8AC3E}">
-        <p14:creationId xmlns:p14="http://schemas.microsoft.com/office/powerpoint/2010/main" val="3169691642"/>
+        <p14:creationId xmlns:p14="http://schemas.microsoft.com/office/powerpoint/2010/main" val="492121233"/>
       </p:ext>
     </p:extLst>
   </p:cSld>
@@ -4863,7 +5308,7 @@
           <p:cNvPr id="2" name="Title 1">
             <a:extLst>
               <a:ext uri="{FF2B5EF4-FFF2-40B4-BE49-F238E27FC236}">
-                <a16:creationId xmlns:a16="http://schemas.microsoft.com/office/drawing/2014/main" id="{9B8897B7-6305-3945-8DEF-E4F2B7374ADC}"/>
+                <a16:creationId xmlns:a16="http://schemas.microsoft.com/office/drawing/2014/main" id="{6D7C3505-BE13-AB49-A1F4-0975C60E6EA3}"/>
               </a:ext>
             </a:extLst>
           </p:cNvPr>
@@ -4881,27 +5326,60 @@
           <a:p>
             <a:r>
               <a:rPr lang="en-US" cap="none" dirty="0"/>
-              <a:t>AVARAGE GOAL FOR AWAY TEAM</a:t>
-            </a:r>
+              <a:t>continues</a:t>
+            </a:r>
+            <a:br>
+              <a:rPr lang="en-US" dirty="0"/>
+            </a:br>
+            <a:r>
+              <a:rPr lang="en-US" sz="2800" dirty="0" err="1"/>
+              <a:t>Avarage</a:t>
+            </a:r>
+            <a:r>
+              <a:rPr lang="en-US" sz="2800" dirty="0"/>
+              <a:t> total corner at home</a:t>
+            </a:r>
+          </a:p>
+        </p:txBody>
+      </p:sp>
+      <p:sp>
+        <p:nvSpPr>
+          <p:cNvPr id="3" name="Content Placeholder 2">
+            <a:extLst>
+              <a:ext uri="{FF2B5EF4-FFF2-40B4-BE49-F238E27FC236}">
+                <a16:creationId xmlns:a16="http://schemas.microsoft.com/office/drawing/2014/main" id="{F6A32CB8-E895-9049-8699-D71367F2A57C}"/>
+              </a:ext>
+            </a:extLst>
+          </p:cNvPr>
+          <p:cNvSpPr>
+            <a:spLocks noGrp="1"/>
+          </p:cNvSpPr>
+          <p:nvPr>
+            <p:ph idx="1"/>
+          </p:nvPr>
+        </p:nvSpPr>
+        <p:spPr/>
+        <p:txBody>
+          <a:bodyPr/>
+          <a:lstStyle/>
+          <a:p>
             <a:endParaRPr lang="en-US" dirty="0"/>
           </a:p>
         </p:txBody>
       </p:sp>
       <p:pic>
         <p:nvPicPr>
-          <p:cNvPr id="5" name="Content Placeholder 4">
+          <p:cNvPr id="7" name="Picture 6">
             <a:extLst>
               <a:ext uri="{FF2B5EF4-FFF2-40B4-BE49-F238E27FC236}">
-                <a16:creationId xmlns:a16="http://schemas.microsoft.com/office/drawing/2014/main" id="{C51F6C04-FF44-FE4D-AA15-8C296A9F8258}"/>
+                <a16:creationId xmlns:a16="http://schemas.microsoft.com/office/drawing/2014/main" id="{3BD996C4-01CB-F448-A5D3-2106A8F4B24C}"/>
               </a:ext>
             </a:extLst>
           </p:cNvPr>
           <p:cNvPicPr>
-            <a:picLocks noGrp="1" noChangeAspect="1"/>
+            <a:picLocks noChangeAspect="1"/>
           </p:cNvPicPr>
-          <p:nvPr>
-            <p:ph idx="1"/>
-          </p:nvPr>
+          <p:nvPr/>
         </p:nvPicPr>
         <p:blipFill>
           <a:blip r:embed="rId2"/>
@@ -4911,15 +5389,18 @@
         </p:blipFill>
         <p:spPr>
           <a:xfrm>
-            <a:off x="1450975" y="2230633"/>
-            <a:ext cx="9604375" cy="3020622"/>
-          </a:xfrm>
+            <a:off x="0" y="1853753"/>
+            <a:ext cx="12192000" cy="3612591"/>
+          </a:xfrm>
+          <a:prstGeom prst="rect">
+            <a:avLst/>
+          </a:prstGeom>
         </p:spPr>
       </p:pic>
     </p:spTree>
     <p:extLst>
       <p:ext uri="{BB962C8B-B14F-4D97-AF65-F5344CB8AC3E}">
-        <p14:creationId xmlns:p14="http://schemas.microsoft.com/office/powerpoint/2010/main" val="3037211085"/>
+        <p14:creationId xmlns:p14="http://schemas.microsoft.com/office/powerpoint/2010/main" val="3737631926"/>
       </p:ext>
     </p:extLst>
   </p:cSld>

</xml_diff>